<commit_message>
segmetação e filtro morfológico aplicado e colocado no slide
</commit_message>
<xml_diff>
--- a/exercício segmentacao/Etapas - Exercício Segmentação.pptx
+++ b/exercício segmentacao/Etapas - Exercício Segmentação.pptx
@@ -13,6 +13,8 @@
     <p:sldId id="259" r:id="rId7"/>
     <p:sldId id="260" r:id="rId8"/>
     <p:sldId id="264" r:id="rId9"/>
+    <p:sldId id="265" r:id="rId10"/>
+    <p:sldId id="266" r:id="rId11"/>
   </p:sldIdLst>
   <p:sldSz cx="12192000" cy="6858000"/>
   <p:notesSz cx="6858000" cy="9144000"/>
@@ -320,7 +322,7 @@
           <a:p>
             <a:fld id="{0EFEBF02-3C1F-44F8-BC76-F524B3A5512E}" type="datetimeFigureOut">
               <a:rPr lang="pt-BR" smtClean="0"/>
-              <a:t>12/09/2019</a:t>
+              <a:t>13/09/2019</a:t>
             </a:fld>
             <a:endParaRPr lang="pt-BR" dirty="0"/>
           </a:p>
@@ -518,7 +520,7 @@
           <a:p>
             <a:fld id="{0EFEBF02-3C1F-44F8-BC76-F524B3A5512E}" type="datetimeFigureOut">
               <a:rPr lang="pt-BR" smtClean="0"/>
-              <a:t>12/09/2019</a:t>
+              <a:t>13/09/2019</a:t>
             </a:fld>
             <a:endParaRPr lang="pt-BR" dirty="0"/>
           </a:p>
@@ -726,7 +728,7 @@
           <a:p>
             <a:fld id="{0EFEBF02-3C1F-44F8-BC76-F524B3A5512E}" type="datetimeFigureOut">
               <a:rPr lang="pt-BR" smtClean="0"/>
-              <a:t>12/09/2019</a:t>
+              <a:t>13/09/2019</a:t>
             </a:fld>
             <a:endParaRPr lang="pt-BR" dirty="0"/>
           </a:p>
@@ -924,7 +926,7 @@
           <a:p>
             <a:fld id="{0EFEBF02-3C1F-44F8-BC76-F524B3A5512E}" type="datetimeFigureOut">
               <a:rPr lang="pt-BR" smtClean="0"/>
-              <a:t>12/09/2019</a:t>
+              <a:t>13/09/2019</a:t>
             </a:fld>
             <a:endParaRPr lang="pt-BR" dirty="0"/>
           </a:p>
@@ -1199,7 +1201,7 @@
           <a:p>
             <a:fld id="{0EFEBF02-3C1F-44F8-BC76-F524B3A5512E}" type="datetimeFigureOut">
               <a:rPr lang="pt-BR" smtClean="0"/>
-              <a:t>12/09/2019</a:t>
+              <a:t>13/09/2019</a:t>
             </a:fld>
             <a:endParaRPr lang="pt-BR" dirty="0"/>
           </a:p>
@@ -1464,7 +1466,7 @@
           <a:p>
             <a:fld id="{0EFEBF02-3C1F-44F8-BC76-F524B3A5512E}" type="datetimeFigureOut">
               <a:rPr lang="pt-BR" smtClean="0"/>
-              <a:t>12/09/2019</a:t>
+              <a:t>13/09/2019</a:t>
             </a:fld>
             <a:endParaRPr lang="pt-BR" dirty="0"/>
           </a:p>
@@ -1876,7 +1878,7 @@
           <a:p>
             <a:fld id="{0EFEBF02-3C1F-44F8-BC76-F524B3A5512E}" type="datetimeFigureOut">
               <a:rPr lang="pt-BR" smtClean="0"/>
-              <a:t>12/09/2019</a:t>
+              <a:t>13/09/2019</a:t>
             </a:fld>
             <a:endParaRPr lang="pt-BR" dirty="0"/>
           </a:p>
@@ -2017,7 +2019,7 @@
           <a:p>
             <a:fld id="{0EFEBF02-3C1F-44F8-BC76-F524B3A5512E}" type="datetimeFigureOut">
               <a:rPr lang="pt-BR" smtClean="0"/>
-              <a:t>12/09/2019</a:t>
+              <a:t>13/09/2019</a:t>
             </a:fld>
             <a:endParaRPr lang="pt-BR" dirty="0"/>
           </a:p>
@@ -2130,7 +2132,7 @@
           <a:p>
             <a:fld id="{0EFEBF02-3C1F-44F8-BC76-F524B3A5512E}" type="datetimeFigureOut">
               <a:rPr lang="pt-BR" smtClean="0"/>
-              <a:t>12/09/2019</a:t>
+              <a:t>13/09/2019</a:t>
             </a:fld>
             <a:endParaRPr lang="pt-BR" dirty="0"/>
           </a:p>
@@ -2441,7 +2443,7 @@
           <a:p>
             <a:fld id="{0EFEBF02-3C1F-44F8-BC76-F524B3A5512E}" type="datetimeFigureOut">
               <a:rPr lang="pt-BR" smtClean="0"/>
-              <a:t>12/09/2019</a:t>
+              <a:t>13/09/2019</a:t>
             </a:fld>
             <a:endParaRPr lang="pt-BR" dirty="0"/>
           </a:p>
@@ -2729,7 +2731,7 @@
           <a:p>
             <a:fld id="{0EFEBF02-3C1F-44F8-BC76-F524B3A5512E}" type="datetimeFigureOut">
               <a:rPr lang="pt-BR" smtClean="0"/>
-              <a:t>12/09/2019</a:t>
+              <a:t>13/09/2019</a:t>
             </a:fld>
             <a:endParaRPr lang="pt-BR" dirty="0"/>
           </a:p>
@@ -2970,7 +2972,7 @@
           <a:p>
             <a:fld id="{0EFEBF02-3C1F-44F8-BC76-F524B3A5512E}" type="datetimeFigureOut">
               <a:rPr lang="pt-BR" smtClean="0"/>
-              <a:t>12/09/2019</a:t>
+              <a:t>13/09/2019</a:t>
             </a:fld>
             <a:endParaRPr lang="pt-BR" dirty="0"/>
           </a:p>
@@ -3505,6 +3507,247 @@
 </p:sld>
 </file>
 
+<file path=ppt/slides/slide10.xml><?xml version="1.0" encoding="utf-8"?>
+<p:sld xmlns:a="http://schemas.openxmlformats.org/drawingml/2006/main" xmlns:r="http://schemas.openxmlformats.org/officeDocument/2006/relationships" xmlns:p="http://schemas.openxmlformats.org/presentationml/2006/main">
+  <p:cSld>
+    <p:spTree>
+      <p:nvGrpSpPr>
+        <p:cNvPr id="1" name=""/>
+        <p:cNvGrpSpPr/>
+        <p:nvPr/>
+      </p:nvGrpSpPr>
+      <p:grpSpPr>
+        <a:xfrm>
+          <a:off x="0" y="0"/>
+          <a:ext cx="0" cy="0"/>
+          <a:chOff x="0" y="0"/>
+          <a:chExt cx="0" cy="0"/>
+        </a:xfrm>
+      </p:grpSpPr>
+      <p:pic>
+        <p:nvPicPr>
+          <p:cNvPr id="9" name="Imagem 8">
+            <a:extLst>
+              <a:ext uri="{FF2B5EF4-FFF2-40B4-BE49-F238E27FC236}">
+                <a16:creationId xmlns:a16="http://schemas.microsoft.com/office/drawing/2014/main" id="{EB9482AF-E57E-450E-9728-11465D33DB72}"/>
+              </a:ext>
+            </a:extLst>
+          </p:cNvPr>
+          <p:cNvPicPr>
+            <a:picLocks noChangeAspect="1"/>
+          </p:cNvPicPr>
+          <p:nvPr/>
+        </p:nvPicPr>
+        <p:blipFill>
+          <a:blip r:embed="rId2"/>
+          <a:stretch>
+            <a:fillRect/>
+          </a:stretch>
+        </p:blipFill>
+        <p:spPr>
+          <a:xfrm>
+            <a:off x="7568250" y="1393813"/>
+            <a:ext cx="4176900" cy="4071600"/>
+          </a:xfrm>
+          <a:prstGeom prst="rect">
+            <a:avLst/>
+          </a:prstGeom>
+        </p:spPr>
+      </p:pic>
+      <p:pic>
+        <p:nvPicPr>
+          <p:cNvPr id="10" name="Imagem 9">
+            <a:extLst>
+              <a:ext uri="{FF2B5EF4-FFF2-40B4-BE49-F238E27FC236}">
+                <a16:creationId xmlns:a16="http://schemas.microsoft.com/office/drawing/2014/main" id="{E8FC3C0F-F655-4EE4-A734-7F27F074DDD2}"/>
+              </a:ext>
+            </a:extLst>
+          </p:cNvPr>
+          <p:cNvPicPr>
+            <a:picLocks noChangeAspect="1"/>
+          </p:cNvPicPr>
+          <p:nvPr/>
+        </p:nvPicPr>
+        <p:blipFill>
+          <a:blip r:embed="rId3"/>
+          <a:stretch>
+            <a:fillRect/>
+          </a:stretch>
+        </p:blipFill>
+        <p:spPr>
+          <a:xfrm>
+            <a:off x="446850" y="1392587"/>
+            <a:ext cx="4178157" cy="4072826"/>
+          </a:xfrm>
+          <a:prstGeom prst="rect">
+            <a:avLst/>
+          </a:prstGeom>
+        </p:spPr>
+      </p:pic>
+      <p:cxnSp>
+        <p:nvCxnSpPr>
+          <p:cNvPr id="12" name="Conector de Seta Reta 11">
+            <a:extLst>
+              <a:ext uri="{FF2B5EF4-FFF2-40B4-BE49-F238E27FC236}">
+                <a16:creationId xmlns:a16="http://schemas.microsoft.com/office/drawing/2014/main" id="{C0470CA5-A92A-4C69-BD9B-BEC5ED50B86F}"/>
+              </a:ext>
+            </a:extLst>
+          </p:cNvPr>
+          <p:cNvCxnSpPr>
+            <a:stCxn id="10" idx="3"/>
+            <a:endCxn id="9" idx="1"/>
+          </p:cNvCxnSpPr>
+          <p:nvPr/>
+        </p:nvCxnSpPr>
+        <p:spPr>
+          <a:xfrm>
+            <a:off x="4625007" y="3429000"/>
+            <a:ext cx="2943243" cy="613"/>
+          </a:xfrm>
+          <a:prstGeom prst="straightConnector1">
+            <a:avLst/>
+          </a:prstGeom>
+          <a:ln w="38100">
+            <a:solidFill>
+              <a:srgbClr val="00B050"/>
+            </a:solidFill>
+            <a:tailEnd type="triangle"/>
+          </a:ln>
+        </p:spPr>
+        <p:style>
+          <a:lnRef idx="1">
+            <a:schemeClr val="accent1"/>
+          </a:lnRef>
+          <a:fillRef idx="0">
+            <a:schemeClr val="accent1"/>
+          </a:fillRef>
+          <a:effectRef idx="0">
+            <a:schemeClr val="accent1"/>
+          </a:effectRef>
+          <a:fontRef idx="minor">
+            <a:schemeClr val="tx1"/>
+          </a:fontRef>
+        </p:style>
+      </p:cxnSp>
+      <p:sp>
+        <p:nvSpPr>
+          <p:cNvPr id="13" name="CaixaDeTexto 12">
+            <a:extLst>
+              <a:ext uri="{FF2B5EF4-FFF2-40B4-BE49-F238E27FC236}">
+                <a16:creationId xmlns:a16="http://schemas.microsoft.com/office/drawing/2014/main" id="{21BDF15E-FB64-4134-951E-2FA4F31F8000}"/>
+              </a:ext>
+            </a:extLst>
+          </p:cNvPr>
+          <p:cNvSpPr txBox="1"/>
+          <p:nvPr/>
+        </p:nvSpPr>
+        <p:spPr>
+          <a:xfrm>
+            <a:off x="4723771" y="2844225"/>
+            <a:ext cx="2744458" cy="584775"/>
+          </a:xfrm>
+          <a:prstGeom prst="rect">
+            <a:avLst/>
+          </a:prstGeom>
+          <a:noFill/>
+        </p:spPr>
+        <p:txBody>
+          <a:bodyPr wrap="square" rtlCol="0">
+            <a:spAutoFit/>
+          </a:bodyPr>
+          <a:lstStyle/>
+          <a:p>
+            <a:pPr algn="ctr"/>
+            <a:r>
+              <a:rPr lang="pt-BR" sz="3200" b="1" dirty="0">
+                <a:solidFill>
+                  <a:srgbClr val="00B050"/>
+                </a:solidFill>
+                <a:latin typeface="Agency FB" panose="020B0503020202020204" pitchFamily="34" charset="0"/>
+              </a:rPr>
+              <a:t>Filtro Morfológico</a:t>
+            </a:r>
+          </a:p>
+        </p:txBody>
+      </p:sp>
+      <p:sp>
+        <p:nvSpPr>
+          <p:cNvPr id="14" name="CaixaDeTexto 13">
+            <a:extLst>
+              <a:ext uri="{FF2B5EF4-FFF2-40B4-BE49-F238E27FC236}">
+                <a16:creationId xmlns:a16="http://schemas.microsoft.com/office/drawing/2014/main" id="{6579B8B7-08A2-40E8-BED6-3411C3D051DC}"/>
+              </a:ext>
+            </a:extLst>
+          </p:cNvPr>
+          <p:cNvSpPr txBox="1"/>
+          <p:nvPr/>
+        </p:nvSpPr>
+        <p:spPr>
+          <a:xfrm>
+            <a:off x="4723771" y="3429000"/>
+            <a:ext cx="2744458" cy="1569660"/>
+          </a:xfrm>
+          <a:prstGeom prst="rect">
+            <a:avLst/>
+          </a:prstGeom>
+          <a:noFill/>
+        </p:spPr>
+        <p:txBody>
+          <a:bodyPr wrap="square" rtlCol="0">
+            <a:spAutoFit/>
+          </a:bodyPr>
+          <a:lstStyle/>
+          <a:p>
+            <a:pPr algn="ctr"/>
+            <a:r>
+              <a:rPr lang="pt-BR" sz="3200" b="1" dirty="0">
+                <a:solidFill>
+                  <a:srgbClr val="00B050"/>
+                </a:solidFill>
+                <a:latin typeface="Agency FB" panose="020B0503020202020204" pitchFamily="34" charset="0"/>
+              </a:rPr>
+              <a:t>Abertura</a:t>
+            </a:r>
+          </a:p>
+          <a:p>
+            <a:pPr algn="ctr"/>
+            <a:r>
+              <a:rPr lang="pt-BR" sz="3200" b="1" dirty="0">
+                <a:solidFill>
+                  <a:srgbClr val="00B050"/>
+                </a:solidFill>
+                <a:latin typeface="Agency FB" panose="020B0503020202020204" pitchFamily="34" charset="0"/>
+              </a:rPr>
+              <a:t>+</a:t>
+            </a:r>
+          </a:p>
+          <a:p>
+            <a:pPr algn="ctr"/>
+            <a:r>
+              <a:rPr lang="pt-BR" sz="3200" b="1" dirty="0">
+                <a:solidFill>
+                  <a:srgbClr val="00B050"/>
+                </a:solidFill>
+                <a:latin typeface="Agency FB" panose="020B0503020202020204" pitchFamily="34" charset="0"/>
+              </a:rPr>
+              <a:t>Fechamento</a:t>
+            </a:r>
+          </a:p>
+        </p:txBody>
+      </p:sp>
+    </p:spTree>
+    <p:extLst>
+      <p:ext uri="{BB962C8B-B14F-4D97-AF65-F5344CB8AC3E}">
+        <p14:creationId xmlns:p14="http://schemas.microsoft.com/office/powerpoint/2010/main" val="3205527850"/>
+      </p:ext>
+    </p:extLst>
+  </p:cSld>
+  <p:clrMapOvr>
+    <a:masterClrMapping/>
+  </p:clrMapOvr>
+</p:sld>
+</file>
+
 <file path=ppt/slides/slide2.xml><?xml version="1.0" encoding="utf-8"?>
 <p:sld xmlns:a="http://schemas.openxmlformats.org/drawingml/2006/main" xmlns:r="http://schemas.openxmlformats.org/officeDocument/2006/relationships" xmlns:p="http://schemas.openxmlformats.org/presentationml/2006/main">
   <p:cSld>
@@ -4629,10 +4872,10 @@
       </p:pic>
       <p:pic>
         <p:nvPicPr>
-          <p:cNvPr id="10" name="Imagem 9">
-            <a:extLst>
-              <a:ext uri="{FF2B5EF4-FFF2-40B4-BE49-F238E27FC236}">
-                <a16:creationId xmlns:a16="http://schemas.microsoft.com/office/drawing/2014/main" id="{8C54FF6D-8B9C-42BA-BE1E-F9DA6C69C919}"/>
+          <p:cNvPr id="4" name="Imagem 3">
+            <a:extLst>
+              <a:ext uri="{FF2B5EF4-FFF2-40B4-BE49-F238E27FC236}">
+                <a16:creationId xmlns:a16="http://schemas.microsoft.com/office/drawing/2014/main" id="{CDBA3E1E-CAC8-4AD4-8BE3-EDBA42CC25F5}"/>
               </a:ext>
             </a:extLst>
           </p:cNvPr>
@@ -4649,8 +4892,8 @@
         </p:blipFill>
         <p:spPr>
           <a:xfrm>
-            <a:off x="7611484" y="4054319"/>
-            <a:ext cx="3664837" cy="2660400"/>
+            <a:off x="7631747" y="4054319"/>
+            <a:ext cx="3624312" cy="2660400"/>
           </a:xfrm>
           <a:prstGeom prst="rect">
             <a:avLst/>
@@ -5486,6 +5729,76 @@
 </p:sld>
 </file>
 
+<file path=ppt/slides/slide9.xml><?xml version="1.0" encoding="utf-8"?>
+<p:sld xmlns:a="http://schemas.openxmlformats.org/drawingml/2006/main" xmlns:r="http://schemas.openxmlformats.org/officeDocument/2006/relationships" xmlns:p="http://schemas.openxmlformats.org/presentationml/2006/main">
+  <p:cSld>
+    <p:spTree>
+      <p:nvGrpSpPr>
+        <p:cNvPr id="1" name=""/>
+        <p:cNvGrpSpPr/>
+        <p:nvPr/>
+      </p:nvGrpSpPr>
+      <p:grpSpPr>
+        <a:xfrm>
+          <a:off x="0" y="0"/>
+          <a:ext cx="0" cy="0"/>
+          <a:chOff x="0" y="0"/>
+          <a:chExt cx="0" cy="0"/>
+        </a:xfrm>
+      </p:grpSpPr>
+      <p:sp>
+        <p:nvSpPr>
+          <p:cNvPr id="2" name="Título 1">
+            <a:extLst>
+              <a:ext uri="{FF2B5EF4-FFF2-40B4-BE49-F238E27FC236}">
+                <a16:creationId xmlns:a16="http://schemas.microsoft.com/office/drawing/2014/main" id="{5751BD0B-4A5D-4154-8BDF-24A63BFF9F82}"/>
+              </a:ext>
+            </a:extLst>
+          </p:cNvPr>
+          <p:cNvSpPr>
+            <a:spLocks noGrp="1"/>
+          </p:cNvSpPr>
+          <p:nvPr>
+            <p:ph type="ctrTitle"/>
+          </p:nvPr>
+        </p:nvSpPr>
+        <p:spPr>
+          <a:xfrm>
+            <a:off x="0" y="2851655"/>
+            <a:ext cx="12192000" cy="1154690"/>
+          </a:xfrm>
+        </p:spPr>
+        <p:txBody>
+          <a:bodyPr>
+            <a:normAutofit/>
+          </a:bodyPr>
+          <a:lstStyle/>
+          <a:p>
+            <a:r>
+              <a:rPr lang="pt-BR" sz="6600" dirty="0">
+                <a:solidFill>
+                  <a:srgbClr val="00B050"/>
+                </a:solidFill>
+                <a:latin typeface="Agency FB" panose="020B0503020202020204" pitchFamily="34" charset="0"/>
+              </a:rPr>
+              <a:t>Morfologia após Segmentação</a:t>
+            </a:r>
+          </a:p>
+        </p:txBody>
+      </p:sp>
+    </p:spTree>
+    <p:extLst>
+      <p:ext uri="{BB962C8B-B14F-4D97-AF65-F5344CB8AC3E}">
+        <p14:creationId xmlns:p14="http://schemas.microsoft.com/office/powerpoint/2010/main" val="1583043771"/>
+      </p:ext>
+    </p:extLst>
+  </p:cSld>
+  <p:clrMapOvr>
+    <a:masterClrMapping/>
+  </p:clrMapOvr>
+</p:sld>
+</file>
+
 <file path=ppt/theme/theme1.xml><?xml version="1.0" encoding="utf-8"?>
 <a:theme xmlns:a="http://schemas.openxmlformats.org/drawingml/2006/main" name="Tema do Office">
   <a:themeElements>

</xml_diff>